<commit_message>
Adicion de tema de manual tecnico y de usuario
</commit_message>
<xml_diff>
--- a/Graficas de arquitectura ag2.pptx
+++ b/Graficas de arquitectura ag2.pptx
@@ -5,12 +5,13 @@
     <p:sldMasterId id="2147483648" r:id="rId1"/>
   </p:sldMasterIdLst>
   <p:notesMasterIdLst>
-    <p:notesMasterId r:id="rId5"/>
+    <p:notesMasterId r:id="rId6"/>
   </p:notesMasterIdLst>
   <p:sldIdLst>
     <p:sldId id="257" r:id="rId2"/>
     <p:sldId id="256" r:id="rId3"/>
     <p:sldId id="258" r:id="rId4"/>
+    <p:sldId id="259" r:id="rId5"/>
   </p:sldIdLst>
   <p:sldSz cx="9144000" cy="6858000" type="screen4x3"/>
   <p:notesSz cx="6858000" cy="9144000"/>
@@ -195,7 +196,7 @@
             <a:fld id="{1B4265EF-58C5-4CF3-9A79-F16CBA089DB8}" type="datetimeFigureOut">
               <a:rPr lang="es-CO" smtClean="0"/>
               <a:pPr/>
-              <a:t>22/03/2012</a:t>
+              <a:t>26/03/2012</a:t>
             </a:fld>
             <a:endParaRPr lang="es-CO"/>
           </a:p>
@@ -366,7 +367,7 @@
     </p:spTree>
     <p:extLst>
       <p:ext uri="{BB962C8B-B14F-4D97-AF65-F5344CB8AC3E}">
-        <p14:creationId xmlns:p14="http://schemas.microsoft.com/office/powerpoint/2010/main" val="3715126184"/>
+        <p14:creationId xmlns:p14="http://schemas.microsoft.com/office/powerpoint/2010/main" xmlns="" val="3715126184"/>
       </p:ext>
     </p:extLst>
   </p:cSld>
@@ -730,7 +731,7 @@
             <a:fld id="{93102B3C-62CC-48D7-BE30-F9D4E7DEC3B6}" type="datetimeFigureOut">
               <a:rPr lang="es-CO" smtClean="0"/>
               <a:pPr/>
-              <a:t>22/03/2012</a:t>
+              <a:t>26/03/2012</a:t>
             </a:fld>
             <a:endParaRPr lang="es-CO"/>
           </a:p>
@@ -897,7 +898,7 @@
             <a:fld id="{93102B3C-62CC-48D7-BE30-F9D4E7DEC3B6}" type="datetimeFigureOut">
               <a:rPr lang="es-CO" smtClean="0"/>
               <a:pPr/>
-              <a:t>22/03/2012</a:t>
+              <a:t>26/03/2012</a:t>
             </a:fld>
             <a:endParaRPr lang="es-CO"/>
           </a:p>
@@ -1074,7 +1075,7 @@
             <a:fld id="{93102B3C-62CC-48D7-BE30-F9D4E7DEC3B6}" type="datetimeFigureOut">
               <a:rPr lang="es-CO" smtClean="0"/>
               <a:pPr/>
-              <a:t>22/03/2012</a:t>
+              <a:t>26/03/2012</a:t>
             </a:fld>
             <a:endParaRPr lang="es-CO"/>
           </a:p>
@@ -1241,7 +1242,7 @@
             <a:fld id="{93102B3C-62CC-48D7-BE30-F9D4E7DEC3B6}" type="datetimeFigureOut">
               <a:rPr lang="es-CO" smtClean="0"/>
               <a:pPr/>
-              <a:t>22/03/2012</a:t>
+              <a:t>26/03/2012</a:t>
             </a:fld>
             <a:endParaRPr lang="es-CO"/>
           </a:p>
@@ -1484,7 +1485,7 @@
             <a:fld id="{93102B3C-62CC-48D7-BE30-F9D4E7DEC3B6}" type="datetimeFigureOut">
               <a:rPr lang="es-CO" smtClean="0"/>
               <a:pPr/>
-              <a:t>22/03/2012</a:t>
+              <a:t>26/03/2012</a:t>
             </a:fld>
             <a:endParaRPr lang="es-CO"/>
           </a:p>
@@ -1769,7 +1770,7 @@
             <a:fld id="{93102B3C-62CC-48D7-BE30-F9D4E7DEC3B6}" type="datetimeFigureOut">
               <a:rPr lang="es-CO" smtClean="0"/>
               <a:pPr/>
-              <a:t>22/03/2012</a:t>
+              <a:t>26/03/2012</a:t>
             </a:fld>
             <a:endParaRPr lang="es-CO"/>
           </a:p>
@@ -2188,7 +2189,7 @@
             <a:fld id="{93102B3C-62CC-48D7-BE30-F9D4E7DEC3B6}" type="datetimeFigureOut">
               <a:rPr lang="es-CO" smtClean="0"/>
               <a:pPr/>
-              <a:t>22/03/2012</a:t>
+              <a:t>26/03/2012</a:t>
             </a:fld>
             <a:endParaRPr lang="es-CO"/>
           </a:p>
@@ -2303,7 +2304,7 @@
             <a:fld id="{93102B3C-62CC-48D7-BE30-F9D4E7DEC3B6}" type="datetimeFigureOut">
               <a:rPr lang="es-CO" smtClean="0"/>
               <a:pPr/>
-              <a:t>22/03/2012</a:t>
+              <a:t>26/03/2012</a:t>
             </a:fld>
             <a:endParaRPr lang="es-CO"/>
           </a:p>
@@ -2395,7 +2396,7 @@
             <a:fld id="{93102B3C-62CC-48D7-BE30-F9D4E7DEC3B6}" type="datetimeFigureOut">
               <a:rPr lang="es-CO" smtClean="0"/>
               <a:pPr/>
-              <a:t>22/03/2012</a:t>
+              <a:t>26/03/2012</a:t>
             </a:fld>
             <a:endParaRPr lang="es-CO"/>
           </a:p>
@@ -2669,7 +2670,7 @@
             <a:fld id="{93102B3C-62CC-48D7-BE30-F9D4E7DEC3B6}" type="datetimeFigureOut">
               <a:rPr lang="es-CO" smtClean="0"/>
               <a:pPr/>
-              <a:t>22/03/2012</a:t>
+              <a:t>26/03/2012</a:t>
             </a:fld>
             <a:endParaRPr lang="es-CO"/>
           </a:p>
@@ -2919,7 +2920,7 @@
             <a:fld id="{93102B3C-62CC-48D7-BE30-F9D4E7DEC3B6}" type="datetimeFigureOut">
               <a:rPr lang="es-CO" smtClean="0"/>
               <a:pPr/>
-              <a:t>22/03/2012</a:t>
+              <a:t>26/03/2012</a:t>
             </a:fld>
             <a:endParaRPr lang="es-CO"/>
           </a:p>
@@ -3129,7 +3130,7 @@
             <a:fld id="{93102B3C-62CC-48D7-BE30-F9D4E7DEC3B6}" type="datetimeFigureOut">
               <a:rPr lang="es-CO" smtClean="0"/>
               <a:pPr/>
-              <a:t>22/03/2012</a:t>
+              <a:t>26/03/2012</a:t>
             </a:fld>
             <a:endParaRPr lang="es-CO"/>
           </a:p>
@@ -4028,7 +4029,7 @@
         <p:spPr>
           <a:xfrm>
             <a:off x="2771800" y="2564904"/>
-            <a:ext cx="2952328" cy="1872208"/>
+            <a:ext cx="3168352" cy="1872208"/>
           </a:xfrm>
           <a:prstGeom prst="roundRect">
             <a:avLst/>
@@ -4056,7 +4057,15 @@
             <a:pPr algn="ctr"/>
             <a:r>
               <a:rPr lang="es-CO" sz="1400" dirty="0" smtClean="0"/>
-              <a:t>Administrador de Reservas anticipadas de  recursos </a:t>
+              <a:t>Administrador de Reservas anticipadas de  recursos (</a:t>
+            </a:r>
+            <a:r>
+              <a:rPr lang="es-CO" sz="1400" dirty="0" smtClean="0"/>
+              <a:t>MDRARG2</a:t>
+            </a:r>
+            <a:r>
+              <a:rPr lang="es-CO" sz="1400" dirty="0" smtClean="0"/>
+              <a:t>) </a:t>
             </a:r>
             <a:endParaRPr lang="es-CO" sz="1400" dirty="0"/>
           </a:p>
@@ -6032,6 +6041,187 @@
           </a:prstGeom>
         </p:spPr>
       </p:pic>
+    </p:spTree>
+  </p:cSld>
+  <p:clrMapOvr>
+    <a:masterClrMapping/>
+  </p:clrMapOvr>
+</p:sld>
+</file>
+
+<file path=ppt/slides/slide4.xml><?xml version="1.0" encoding="utf-8"?>
+<p:sld xmlns:a="http://schemas.openxmlformats.org/drawingml/2006/main" xmlns:r="http://schemas.openxmlformats.org/officeDocument/2006/relationships" xmlns:p="http://schemas.openxmlformats.org/presentationml/2006/main">
+  <p:cSld>
+    <p:spTree>
+      <p:nvGrpSpPr>
+        <p:cNvPr id="1" name=""/>
+        <p:cNvGrpSpPr/>
+        <p:nvPr/>
+      </p:nvGrpSpPr>
+      <p:grpSpPr>
+        <a:xfrm>
+          <a:off x="0" y="0"/>
+          <a:ext cx="0" cy="0"/>
+          <a:chOff x="0" y="0"/>
+          <a:chExt cx="0" cy="0"/>
+        </a:xfrm>
+      </p:grpSpPr>
+      <p:sp>
+        <p:nvSpPr>
+          <p:cNvPr id="2" name="1 Título"/>
+          <p:cNvSpPr>
+            <a:spLocks noGrp="1"/>
+          </p:cNvSpPr>
+          <p:nvPr>
+            <p:ph type="title"/>
+          </p:nvPr>
+        </p:nvSpPr>
+        <p:spPr/>
+        <p:txBody>
+          <a:bodyPr/>
+          <a:lstStyle/>
+          <a:p>
+            <a:endParaRPr lang="es-CO"/>
+          </a:p>
+        </p:txBody>
+      </p:sp>
+      <p:sp>
+        <p:nvSpPr>
+          <p:cNvPr id="5" name="4 Rectángulo redondeado"/>
+          <p:cNvSpPr/>
+          <p:nvPr/>
+        </p:nvSpPr>
+        <p:spPr>
+          <a:xfrm>
+            <a:off x="2771800" y="2564904"/>
+            <a:ext cx="3168352" cy="1872208"/>
+          </a:xfrm>
+          <a:prstGeom prst="roundRect">
+            <a:avLst/>
+          </a:prstGeom>
+          <a:ln w="12700"/>
+        </p:spPr>
+        <p:style>
+          <a:lnRef idx="2">
+            <a:schemeClr val="accent6"/>
+          </a:lnRef>
+          <a:fillRef idx="1">
+            <a:schemeClr val="lt1"/>
+          </a:fillRef>
+          <a:effectRef idx="0">
+            <a:schemeClr val="accent6"/>
+          </a:effectRef>
+          <a:fontRef idx="minor">
+            <a:schemeClr val="dk1"/>
+          </a:fontRef>
+        </p:style>
+        <p:txBody>
+          <a:bodyPr rtlCol="0" anchor="t" anchorCtr="0"/>
+          <a:lstStyle/>
+          <a:p>
+            <a:pPr algn="ctr"/>
+            <a:r>
+              <a:rPr lang="es-CO" sz="1400" dirty="0" smtClean="0"/>
+              <a:t>Administrador de Reservas anticipadas de  recursos (</a:t>
+            </a:r>
+            <a:r>
+              <a:rPr lang="es-CO" sz="1400" dirty="0" smtClean="0"/>
+              <a:t>MDRARG2</a:t>
+            </a:r>
+            <a:r>
+              <a:rPr lang="es-CO" sz="1400" dirty="0" smtClean="0"/>
+              <a:t>) </a:t>
+            </a:r>
+            <a:endParaRPr lang="es-CO" sz="1400" dirty="0"/>
+          </a:p>
+        </p:txBody>
+      </p:sp>
+      <p:sp>
+        <p:nvSpPr>
+          <p:cNvPr id="6" name="5 Rectángulo redondeado"/>
+          <p:cNvSpPr/>
+          <p:nvPr/>
+        </p:nvSpPr>
+        <p:spPr>
+          <a:xfrm>
+            <a:off x="3347864" y="3140968"/>
+            <a:ext cx="1728192" cy="576064"/>
+          </a:xfrm>
+          <a:prstGeom prst="roundRect">
+            <a:avLst/>
+          </a:prstGeom>
+          <a:ln w="12700"/>
+        </p:spPr>
+        <p:style>
+          <a:lnRef idx="2">
+            <a:schemeClr val="accent6"/>
+          </a:lnRef>
+          <a:fillRef idx="1">
+            <a:schemeClr val="lt1"/>
+          </a:fillRef>
+          <a:effectRef idx="0">
+            <a:schemeClr val="accent6"/>
+          </a:effectRef>
+          <a:fontRef idx="minor">
+            <a:schemeClr val="dk1"/>
+          </a:fontRef>
+        </p:style>
+        <p:txBody>
+          <a:bodyPr rtlCol="0" anchor="ctr"/>
+          <a:lstStyle/>
+          <a:p>
+            <a:pPr algn="ctr"/>
+            <a:r>
+              <a:rPr lang="es-CO" sz="1200" dirty="0" smtClean="0"/>
+              <a:t>Analizador de reservaciones</a:t>
+            </a:r>
+            <a:endParaRPr lang="es-CO" sz="1200" dirty="0"/>
+          </a:p>
+        </p:txBody>
+      </p:sp>
+      <p:sp>
+        <p:nvSpPr>
+          <p:cNvPr id="7" name="6 Rectángulo redondeado"/>
+          <p:cNvSpPr/>
+          <p:nvPr/>
+        </p:nvSpPr>
+        <p:spPr>
+          <a:xfrm>
+            <a:off x="3347864" y="3789040"/>
+            <a:ext cx="1728192" cy="576064"/>
+          </a:xfrm>
+          <a:prstGeom prst="roundRect">
+            <a:avLst/>
+          </a:prstGeom>
+          <a:ln w="12700"/>
+        </p:spPr>
+        <p:style>
+          <a:lnRef idx="2">
+            <a:schemeClr val="accent6"/>
+          </a:lnRef>
+          <a:fillRef idx="1">
+            <a:schemeClr val="lt1"/>
+          </a:fillRef>
+          <a:effectRef idx="0">
+            <a:schemeClr val="accent6"/>
+          </a:effectRef>
+          <a:fontRef idx="minor">
+            <a:schemeClr val="dk1"/>
+          </a:fontRef>
+        </p:style>
+        <p:txBody>
+          <a:bodyPr rtlCol="0" anchor="ctr"/>
+          <a:lstStyle/>
+          <a:p>
+            <a:pPr algn="ctr"/>
+            <a:r>
+              <a:rPr lang="es-CO" sz="1200" dirty="0" smtClean="0"/>
+              <a:t>Calendario de reservaciones</a:t>
+            </a:r>
+            <a:endParaRPr lang="es-CO" sz="1200" dirty="0"/>
+          </a:p>
+        </p:txBody>
+      </p:sp>
     </p:spTree>
   </p:cSld>
   <p:clrMapOvr>

</xml_diff>